<commit_message>
Update Mini Project( without task1 task2 ).pptx
</commit_message>
<xml_diff>
--- a/Mini Project( without task1 task2 ).pptx
+++ b/Mini Project( without task1 task2 ).pptx
@@ -9,13 +9,14 @@
   </p:notesMasterIdLst>
   <p:sldIdLst>
     <p:sldId id="260" r:id="rId3"/>
-    <p:sldId id="267" r:id="rId4"/>
-    <p:sldId id="264" r:id="rId6"/>
-    <p:sldId id="263" r:id="rId7"/>
-    <p:sldId id="258" r:id="rId8"/>
-    <p:sldId id="265" r:id="rId9"/>
-    <p:sldId id="259" r:id="rId10"/>
-    <p:sldId id="268" r:id="rId11"/>
+    <p:sldId id="275" r:id="rId4"/>
+    <p:sldId id="267" r:id="rId6"/>
+    <p:sldId id="264" r:id="rId7"/>
+    <p:sldId id="263" r:id="rId8"/>
+    <p:sldId id="258" r:id="rId9"/>
+    <p:sldId id="265" r:id="rId10"/>
+    <p:sldId id="259" r:id="rId11"/>
+    <p:sldId id="268" r:id="rId12"/>
   </p:sldIdLst>
   <p:sldSz cx="12192000" cy="6858000"/>
   <p:notesSz cx="6858000" cy="9144000"/>
@@ -465,6 +466,109 @@
 </file>
 
 <file path=ppt/notesSlides/notesSlide1.xml><?xml version="1.0" encoding="utf-8"?>
+<p:notes xmlns:a="http://schemas.openxmlformats.org/drawingml/2006/main" xmlns:r="http://schemas.openxmlformats.org/officeDocument/2006/relationships" xmlns:p="http://schemas.openxmlformats.org/presentationml/2006/main" showMasterPhAnim="0" showMasterSp="0">
+  <p:cSld>
+    <p:spTree>
+      <p:nvGrpSpPr>
+        <p:cNvPr id="1" name="Shape 315"/>
+        <p:cNvGrpSpPr/>
+        <p:nvPr/>
+      </p:nvGrpSpPr>
+      <p:grpSpPr>
+        <a:xfrm>
+          <a:off x="0" y="0"/>
+          <a:ext cx="0" cy="0"/>
+          <a:chOff x="0" y="0"/>
+          <a:chExt cx="0" cy="0"/>
+        </a:xfrm>
+      </p:grpSpPr>
+      <p:sp>
+        <p:nvSpPr>
+          <p:cNvPr id="316" name="Google Shape;316;ga6a217c1e4_0_578:notes"/>
+          <p:cNvSpPr>
+            <a:spLocks noGrp="1" noRot="1" noChangeAspect="1"/>
+          </p:cNvSpPr>
+          <p:nvPr>
+            <p:ph type="sldImg" idx="2"/>
+          </p:nvPr>
+        </p:nvSpPr>
+        <p:spPr>
+          <a:xfrm>
+            <a:off x="381000" y="685800"/>
+            <a:ext cx="6096000" cy="3429000"/>
+          </a:xfrm>
+          <a:custGeom>
+            <a:avLst/>
+            <a:gdLst/>
+            <a:ahLst/>
+            <a:cxnLst/>
+            <a:rect l="l" t="t" r="r" b="b"/>
+            <a:pathLst>
+              <a:path w="120000" h="120000" extrusionOk="0">
+                <a:moveTo>
+                  <a:pt x="0" y="0"/>
+                </a:moveTo>
+                <a:lnTo>
+                  <a:pt x="120000" y="0"/>
+                </a:lnTo>
+                <a:lnTo>
+                  <a:pt x="120000" y="120000"/>
+                </a:lnTo>
+                <a:lnTo>
+                  <a:pt x="0" y="120000"/>
+                </a:lnTo>
+                <a:close/>
+              </a:path>
+            </a:pathLst>
+          </a:custGeom>
+        </p:spPr>
+      </p:sp>
+      <p:sp>
+        <p:nvSpPr>
+          <p:cNvPr id="317" name="Google Shape;317;ga6a217c1e4_0_578:notes"/>
+          <p:cNvSpPr txBox="1">
+            <a:spLocks noGrp="1"/>
+          </p:cNvSpPr>
+          <p:nvPr>
+            <p:ph type="body" idx="1"/>
+          </p:nvPr>
+        </p:nvSpPr>
+        <p:spPr>
+          <a:xfrm>
+            <a:off x="685800" y="4343400"/>
+            <a:ext cx="5486400" cy="4114800"/>
+          </a:xfrm>
+          <a:prstGeom prst="rect">
+            <a:avLst/>
+          </a:prstGeom>
+        </p:spPr>
+        <p:txBody>
+          <a:bodyPr spcFirstLastPara="1" wrap="square" lIns="91425" tIns="91425" rIns="91425" bIns="91425" anchor="t" anchorCtr="0">
+            <a:noAutofit/>
+          </a:bodyPr>
+          <a:lstStyle/>
+          <a:p>
+            <a:pPr marL="0" lvl="0" indent="0" algn="l" rtl="0">
+              <a:spcBef>
+                <a:spcPts val="0"/>
+              </a:spcBef>
+              <a:spcAft>
+                <a:spcPts val="0"/>
+              </a:spcAft>
+              <a:buNone/>
+            </a:pPr>
+          </a:p>
+        </p:txBody>
+      </p:sp>
+    </p:spTree>
+  </p:cSld>
+  <p:clrMapOvr>
+    <a:masterClrMapping/>
+  </p:clrMapOvr>
+</p:notes>
+</file>
+
+<file path=ppt/notesSlides/notesSlide2.xml><?xml version="1.0" encoding="utf-8"?>
 <p:notes xmlns:a="http://schemas.openxmlformats.org/drawingml/2006/main" xmlns:r="http://schemas.openxmlformats.org/officeDocument/2006/relationships" xmlns:p="http://schemas.openxmlformats.org/presentationml/2006/main">
   <p:cSld>
     <p:spTree>
@@ -508,7 +612,51 @@
 </p:notes>
 </file>
 
-<file path=ppt/notesSlides/notesSlide2.xml><?xml version="1.0" encoding="utf-8"?>
+<file path=ppt/notesSlides/notesSlide3.xml><?xml version="1.0" encoding="utf-8"?>
+<p:notes xmlns:a="http://schemas.openxmlformats.org/drawingml/2006/main" xmlns:r="http://schemas.openxmlformats.org/officeDocument/2006/relationships" xmlns:p="http://schemas.openxmlformats.org/presentationml/2006/main">
+  <p:cSld>
+    <p:spTree>
+      <p:nvGrpSpPr>
+        <p:cNvPr id="1" name=""/>
+        <p:cNvGrpSpPr/>
+        <p:nvPr/>
+      </p:nvGrpSpPr>
+      <p:grpSpPr/>
+      <p:sp>
+        <p:nvSpPr>
+          <p:cNvPr id="2" name="Slide Image Placeholder 1"/>
+          <p:cNvSpPr/>
+          <p:nvPr>
+            <p:ph type="sldImg" idx="2"/>
+          </p:nvPr>
+        </p:nvSpPr>
+        <p:spPr/>
+      </p:sp>
+      <p:sp>
+        <p:nvSpPr>
+          <p:cNvPr id="3" name="Text Placeholder 2"/>
+          <p:cNvSpPr/>
+          <p:nvPr>
+            <p:ph type="body" idx="3"/>
+          </p:nvPr>
+        </p:nvSpPr>
+        <p:spPr/>
+        <p:txBody>
+          <a:bodyPr/>
+          <a:p>
+            <a:endParaRPr lang="en-US"/>
+          </a:p>
+        </p:txBody>
+      </p:sp>
+    </p:spTree>
+  </p:cSld>
+  <p:clrMapOvr>
+    <a:masterClrMapping/>
+  </p:clrMapOvr>
+</p:notes>
+</file>
+
+<file path=ppt/notesSlides/notesSlide4.xml><?xml version="1.0" encoding="utf-8"?>
 <p:notes xmlns:a="http://schemas.openxmlformats.org/drawingml/2006/main" xmlns:r="http://schemas.openxmlformats.org/officeDocument/2006/relationships" xmlns:p="http://schemas.openxmlformats.org/presentationml/2006/main">
   <p:cSld>
     <p:spTree>
@@ -3377,7 +3525,7 @@
         </p:spPr>
         <p:txBody>
           <a:bodyPr>
-            <a:normAutofit fontScale="90000"/>
+            <a:normAutofit/>
           </a:bodyPr>
           <a:p>
             <a:pPr algn="ctr"/>
@@ -3398,28 +3546,9 @@
                 <a:cs typeface="Georgia" panose="02040502050405020303" charset="0"/>
                 <a:sym typeface="+mn-ea"/>
               </a:rPr>
-              <a:t>Multimodal Hateful Meme Detection.</a:t>
-            </a:r>
-            <a:r>
-              <a:rPr lang="en-US">
-                <a:solidFill>
-                  <a:schemeClr val="tx1"/>
-                </a:solidFill>
-                <a:effectLst>
-                  <a:innerShdw blurRad="63500" dist="50800" dir="13500000">
-                    <a:srgbClr val="000000">
-                      <a:alpha val="50000"/>
-                    </a:srgbClr>
-                  </a:innerShdw>
-                </a:effectLst>
-                <a:uFillTx/>
-                <a:latin typeface="Georgia" panose="02040502050405020303" charset="0"/>
-                <a:cs typeface="Georgia" panose="02040502050405020303" charset="0"/>
-                <a:sym typeface="+mn-ea"/>
-              </a:rPr>
-              <a:t> </a:t>
-            </a:r>
-            <a:endParaRPr lang="en-US" altLang="en-US">
+              <a:t>Detecting Hate Speech in Memes</a:t>
+            </a:r>
+            <a:endParaRPr lang="en-US" b="1">
               <a:solidFill>
                 <a:schemeClr val="tx1"/>
               </a:solidFill>
@@ -3451,33 +3580,139 @@
   <p:cSld>
     <p:spTree>
       <p:nvGrpSpPr>
-        <p:cNvPr id="1" name=""/>
+        <p:cNvPr id="1" name="Shape 318"/>
         <p:cNvGrpSpPr/>
         <p:nvPr/>
       </p:nvGrpSpPr>
-      <p:grpSpPr/>
-      <p:sp>
-        <p:nvSpPr>
-          <p:cNvPr id="2" name="Title 1"/>
-          <p:cNvSpPr>
+      <p:grpSpPr>
+        <a:xfrm>
+          <a:off x="0" y="0"/>
+          <a:ext cx="0" cy="0"/>
+          <a:chOff x="0" y="0"/>
+          <a:chExt cx="0" cy="0"/>
+        </a:xfrm>
+      </p:grpSpPr>
+      <p:sp>
+        <p:nvSpPr>
+          <p:cNvPr id="319" name="Google Shape;319;p20"/>
+          <p:cNvSpPr txBox="1">
             <a:spLocks noGrp="1"/>
           </p:cNvSpPr>
           <p:nvPr>
             <p:ph type="title"/>
           </p:nvPr>
         </p:nvSpPr>
-        <p:spPr/>
-        <p:txBody>
-          <a:bodyPr/>
-          <a:p>
-            <a:r>
-              <a:rPr lang="en-IN" altLang="en-US" sz="3600" b="1">
+        <p:spPr>
+          <a:prstGeom prst="rect">
+            <a:avLst/>
+          </a:prstGeom>
+        </p:spPr>
+        <p:txBody>
+          <a:bodyPr spcFirstLastPara="1" wrap="square" lIns="121900" tIns="121900" rIns="121900" bIns="121900" anchor="t" anchorCtr="0">
+            <a:noAutofit/>
+          </a:bodyPr>
+          <a:lstStyle/>
+          <a:p>
+            <a:pPr marL="0" lvl="0" indent="0" algn="ctr" rtl="0">
+              <a:spcBef>
+                <a:spcPts val="0"/>
+              </a:spcBef>
+              <a:spcAft>
+                <a:spcPts val="0"/>
+              </a:spcAft>
+              <a:buNone/>
+            </a:pPr>
+            <a:r>
+              <a:rPr lang="en-US" dirty="0">
+                <a:latin typeface="Georgia" panose="02040502050405020303" charset="0"/>
+                <a:cs typeface="Georgia" panose="02040502050405020303" charset="0"/>
+                <a:sym typeface="+mn-ea"/>
+              </a:rPr>
+              <a:t>     Proposed Methodology</a:t>
+            </a:r>
+            <a:br>
+              <a:rPr lang="en-US" dirty="0">
+                <a:latin typeface="Georgia" panose="02040502050405020303" charset="0"/>
+                <a:cs typeface="Georgia" panose="02040502050405020303" charset="0"/>
+                <a:sym typeface="+mn-ea"/>
+              </a:rPr>
+            </a:br>
+            <a:endParaRPr lang="en-US" dirty="0">
+              <a:latin typeface="Georgia" panose="02040502050405020303" charset="0"/>
+              <a:cs typeface="Georgia" panose="02040502050405020303" charset="0"/>
+              <a:sym typeface="+mn-ea"/>
+            </a:endParaRPr>
+          </a:p>
+        </p:txBody>
+      </p:sp>
+      <p:sp>
+        <p:nvSpPr>
+          <p:cNvPr id="2" name="Rounded Rectangle 1"/>
+          <p:cNvSpPr/>
+          <p:nvPr/>
+        </p:nvSpPr>
+        <p:spPr>
+          <a:xfrm>
+            <a:off x="2916555" y="2177415"/>
+            <a:ext cx="3108325" cy="2781300"/>
+          </a:xfrm>
+          <a:prstGeom prst="roundRect">
+            <a:avLst/>
+          </a:prstGeom>
+        </p:spPr>
+        <p:style>
+          <a:lnRef idx="2">
+            <a:schemeClr val="accent3"/>
+          </a:lnRef>
+          <a:fillRef idx="1">
+            <a:schemeClr val="lt1"/>
+          </a:fillRef>
+          <a:effectRef idx="0">
+            <a:schemeClr val="accent3"/>
+          </a:effectRef>
+          <a:fontRef idx="minor">
+            <a:schemeClr val="dk1"/>
+          </a:fontRef>
+        </p:style>
+        <p:txBody>
+          <a:bodyPr rtlCol="0" anchor="ctr"/>
+          <a:lstStyle/>
+          <a:p>
+            <a:pPr algn="ctr"/>
+            <a:endParaRPr lang="en-US" sz="2400"/>
+          </a:p>
+        </p:txBody>
+      </p:sp>
+      <p:sp>
+        <p:nvSpPr>
+          <p:cNvPr id="5" name="Text Box 0"/>
+          <p:cNvSpPr txBox="1"/>
+          <p:nvPr/>
+        </p:nvSpPr>
+        <p:spPr>
+          <a:xfrm>
+            <a:off x="1399540" y="2113280"/>
+            <a:ext cx="936625" cy="460375"/>
+          </a:xfrm>
+          <a:prstGeom prst="rect">
+            <a:avLst/>
+          </a:prstGeom>
+          <a:noFill/>
+        </p:spPr>
+        <p:txBody>
+          <a:bodyPr wrap="none" rtlCol="0">
+            <a:spAutoFit/>
+          </a:bodyPr>
+          <a:lstStyle/>
+          <a:p>
+            <a:r>
+              <a:rPr lang="en-US" sz="2400">
                 <a:latin typeface="Georgia" panose="02040502050405020303" charset="0"/>
                 <a:cs typeface="Georgia" panose="02040502050405020303" charset="0"/>
               </a:rPr>
-              <a:t>Modals for Text Embeddings </a:t>
-            </a:r>
-            <a:endParaRPr lang="en-IN" altLang="en-US" sz="3600" b="1">
+              <a:t>Input</a:t>
+            </a:r>
+            <a:endParaRPr lang="en-US" sz="2400">
               <a:latin typeface="Georgia" panose="02040502050405020303" charset="0"/>
               <a:cs typeface="Georgia" panose="02040502050405020303" charset="0"/>
             </a:endParaRPr>
@@ -3486,156 +3721,593 @@
       </p:sp>
       <p:sp>
         <p:nvSpPr>
-          <p:cNvPr id="3" name="Content Placeholder 2"/>
-          <p:cNvSpPr>
-            <a:spLocks noGrp="1"/>
-          </p:cNvSpPr>
-          <p:nvPr>
-            <p:ph idx="1"/>
-          </p:nvPr>
-        </p:nvSpPr>
-        <p:spPr/>
-        <p:txBody>
-          <a:bodyPr/>
-          <a:p>
+          <p:cNvPr id="3" name="Text Box 2"/>
+          <p:cNvSpPr txBox="1"/>
+          <p:nvPr/>
+        </p:nvSpPr>
+        <p:spPr>
+          <a:xfrm>
+            <a:off x="7755467" y="4482253"/>
+            <a:ext cx="1144905" cy="460375"/>
+          </a:xfrm>
+          <a:prstGeom prst="rect">
+            <a:avLst/>
+          </a:prstGeom>
+          <a:noFill/>
+        </p:spPr>
+        <p:txBody>
+          <a:bodyPr wrap="none" rtlCol="0">
+            <a:spAutoFit/>
+          </a:bodyPr>
+          <a:lstStyle/>
+          <a:p>
+            <a:r>
+              <a:rPr lang="en-US" sz="2400">
+                <a:latin typeface="Georgia" panose="02040502050405020303" charset="0"/>
+                <a:cs typeface="Georgia" panose="02040502050405020303" charset="0"/>
+              </a:rPr>
+              <a:t>Output</a:t>
+            </a:r>
+            <a:endParaRPr lang="en-US" sz="2400">
+              <a:latin typeface="Georgia" panose="02040502050405020303" charset="0"/>
+              <a:cs typeface="Georgia" panose="02040502050405020303" charset="0"/>
+            </a:endParaRPr>
+          </a:p>
+        </p:txBody>
+      </p:sp>
+      <p:sp>
+        <p:nvSpPr>
+          <p:cNvPr id="7" name="Rounded Rectangle 6"/>
+          <p:cNvSpPr/>
+          <p:nvPr/>
+        </p:nvSpPr>
+        <p:spPr>
+          <a:xfrm>
+            <a:off x="3393440" y="3719195"/>
+            <a:ext cx="2251075" cy="995045"/>
+          </a:xfrm>
+          <a:prstGeom prst="roundRect">
+            <a:avLst/>
+          </a:prstGeom>
+        </p:spPr>
+        <p:style>
+          <a:lnRef idx="2">
+            <a:schemeClr val="accent1"/>
+          </a:lnRef>
+          <a:fillRef idx="1">
+            <a:schemeClr val="lt1"/>
+          </a:fillRef>
+          <a:effectRef idx="0">
+            <a:schemeClr val="accent1"/>
+          </a:effectRef>
+          <a:fontRef idx="minor">
+            <a:schemeClr val="dk1"/>
+          </a:fontRef>
+        </p:style>
+        <p:txBody>
+          <a:bodyPr rtlCol="0" anchor="ctr"/>
+          <a:lstStyle/>
+          <a:p>
+            <a:pPr algn="ctr"/>
+            <a:r>
+              <a:rPr lang="en-US" sz="2400" dirty="0">
+                <a:latin typeface="Georgia" panose="02040502050405020303" charset="0"/>
+                <a:cs typeface="Georgia" panose="02040502050405020303" charset="0"/>
+              </a:rPr>
+              <a:t>Visual Module</a:t>
+            </a:r>
+            <a:br>
+              <a:rPr lang="en-US" sz="2400" dirty="0">
+                <a:latin typeface="Georgia" panose="02040502050405020303" charset="0"/>
+                <a:cs typeface="Georgia" panose="02040502050405020303" charset="0"/>
+              </a:rPr>
+            </a:br>
+            <a:r>
+              <a:rPr lang="en-US" sz="2400" dirty="0">
+                <a:latin typeface="Georgia" panose="02040502050405020303" charset="0"/>
+                <a:cs typeface="Georgia" panose="02040502050405020303" charset="0"/>
+              </a:rPr>
+              <a:t>(</a:t>
+            </a:r>
+            <a:r>
+              <a:rPr lang="en-IN" altLang="en-US" sz="2400" dirty="0">
+                <a:latin typeface="Georgia" panose="02040502050405020303" charset="0"/>
+                <a:cs typeface="Georgia" panose="02040502050405020303" charset="0"/>
+              </a:rPr>
+              <a:t>Xception</a:t>
+            </a:r>
+            <a:r>
+              <a:rPr lang="en-US" sz="2400" dirty="0">
+                <a:latin typeface="Georgia" panose="02040502050405020303" charset="0"/>
+                <a:cs typeface="Georgia" panose="02040502050405020303" charset="0"/>
+              </a:rPr>
+              <a:t>)</a:t>
+            </a:r>
+            <a:endParaRPr lang="en-US" sz="2400" dirty="0">
+              <a:latin typeface="Georgia" panose="02040502050405020303" charset="0"/>
+              <a:cs typeface="Georgia" panose="02040502050405020303" charset="0"/>
+            </a:endParaRPr>
+          </a:p>
+        </p:txBody>
+      </p:sp>
+      <p:sp>
+        <p:nvSpPr>
+          <p:cNvPr id="8" name="Rounded Rectangle 7"/>
+          <p:cNvSpPr/>
+          <p:nvPr/>
+        </p:nvSpPr>
+        <p:spPr>
+          <a:xfrm>
+            <a:off x="3376507" y="2604347"/>
+            <a:ext cx="2186940" cy="629073"/>
+          </a:xfrm>
+          <a:prstGeom prst="roundRect">
+            <a:avLst/>
+          </a:prstGeom>
+        </p:spPr>
+        <p:style>
+          <a:lnRef idx="2">
+            <a:schemeClr val="accent1"/>
+          </a:lnRef>
+          <a:fillRef idx="1">
+            <a:schemeClr val="lt1"/>
+          </a:fillRef>
+          <a:effectRef idx="0">
+            <a:schemeClr val="accent1"/>
+          </a:effectRef>
+          <a:fontRef idx="minor">
+            <a:schemeClr val="dk1"/>
+          </a:fontRef>
+        </p:style>
+        <p:txBody>
+          <a:bodyPr rtlCol="0" anchor="ctr"/>
+          <a:lstStyle/>
+          <a:p>
+            <a:pPr algn="ctr"/>
+            <a:r>
+              <a:rPr lang="en-US" sz="2400" dirty="0">
+                <a:latin typeface="Georgia" panose="02040502050405020303" charset="0"/>
+                <a:cs typeface="Georgia" panose="02040502050405020303" charset="0"/>
+              </a:rPr>
+              <a:t>Text Module</a:t>
+            </a:r>
+            <a:br>
+              <a:rPr lang="en-US" sz="2400" dirty="0">
+                <a:latin typeface="Georgia" panose="02040502050405020303" charset="0"/>
+                <a:cs typeface="Georgia" panose="02040502050405020303" charset="0"/>
+              </a:rPr>
+            </a:br>
+            <a:r>
+              <a:rPr lang="en-US" sz="2400" dirty="0">
+                <a:latin typeface="Georgia" panose="02040502050405020303" charset="0"/>
+                <a:cs typeface="Georgia" panose="02040502050405020303" charset="0"/>
+              </a:rPr>
+              <a:t>(Sbert)</a:t>
+            </a:r>
+            <a:endParaRPr lang="en-US" sz="2400" dirty="0">
+              <a:latin typeface="Georgia" panose="02040502050405020303" charset="0"/>
+              <a:cs typeface="Georgia" panose="02040502050405020303" charset="0"/>
+            </a:endParaRPr>
+          </a:p>
+        </p:txBody>
+      </p:sp>
+      <p:sp>
+        <p:nvSpPr>
+          <p:cNvPr id="9" name="Rounded Rectangle 8"/>
+          <p:cNvSpPr/>
+          <p:nvPr/>
+        </p:nvSpPr>
+        <p:spPr>
+          <a:xfrm>
+            <a:off x="6410960" y="3233420"/>
+            <a:ext cx="2186940" cy="629073"/>
+          </a:xfrm>
+          <a:prstGeom prst="roundRect">
+            <a:avLst/>
+          </a:prstGeom>
+        </p:spPr>
+        <p:style>
+          <a:lnRef idx="2">
+            <a:schemeClr val="accent1"/>
+          </a:lnRef>
+          <a:fillRef idx="1">
+            <a:schemeClr val="lt1"/>
+          </a:fillRef>
+          <a:effectRef idx="0">
+            <a:schemeClr val="accent1"/>
+          </a:effectRef>
+          <a:fontRef idx="minor">
+            <a:schemeClr val="dk1"/>
+          </a:fontRef>
+        </p:style>
+        <p:txBody>
+          <a:bodyPr rtlCol="0" anchor="ctr"/>
+          <a:lstStyle/>
+          <a:p>
+            <a:pPr algn="ctr"/>
             <a:r>
               <a:rPr lang="en-IN" altLang="en-US" sz="2400">
                 <a:latin typeface="Georgia" panose="02040502050405020303" charset="0"/>
                 <a:cs typeface="Georgia" panose="02040502050405020303" charset="0"/>
               </a:rPr>
-              <a:t>Word 2 vec</a:t>
+              <a:t>GMU</a:t>
             </a:r>
             <a:endParaRPr lang="en-IN" altLang="en-US" sz="2400">
               <a:latin typeface="Georgia" panose="02040502050405020303" charset="0"/>
               <a:cs typeface="Georgia" panose="02040502050405020303" charset="0"/>
             </a:endParaRPr>
           </a:p>
-          <a:p>
-            <a:r>
-              <a:rPr lang="en-IN" altLang="en-US" sz="2400">
+        </p:txBody>
+      </p:sp>
+      <p:cxnSp>
+        <p:nvCxnSpPr>
+          <p:cNvPr id="10" name="Straight Arrow Connector 9"/>
+          <p:cNvCxnSpPr/>
+          <p:nvPr/>
+        </p:nvCxnSpPr>
+        <p:spPr>
+          <a:xfrm>
+            <a:off x="8283787" y="3896360"/>
+            <a:ext cx="2540" cy="671407"/>
+          </a:xfrm>
+          <a:prstGeom prst="straightConnector1">
+            <a:avLst/>
+          </a:prstGeom>
+          <a:ln w="41275" cmpd="sng">
+            <a:solidFill>
+              <a:schemeClr val="accent1">
+                <a:shade val="50000"/>
+              </a:schemeClr>
+            </a:solidFill>
+            <a:prstDash val="solid"/>
+            <a:tailEnd type="arrow"/>
+          </a:ln>
+        </p:spPr>
+        <p:style>
+          <a:lnRef idx="1">
+            <a:schemeClr val="accent1"/>
+          </a:lnRef>
+          <a:fillRef idx="0">
+            <a:schemeClr val="accent1"/>
+          </a:fillRef>
+          <a:effectRef idx="0">
+            <a:schemeClr val="accent1"/>
+          </a:effectRef>
+          <a:fontRef idx="minor">
+            <a:schemeClr val="tx1"/>
+          </a:fontRef>
+        </p:style>
+      </p:cxnSp>
+      <p:cxnSp>
+        <p:nvCxnSpPr>
+          <p:cNvPr id="11" name="Straight Arrow Connector 10"/>
+          <p:cNvCxnSpPr/>
+          <p:nvPr/>
+        </p:nvCxnSpPr>
+        <p:spPr>
+          <a:xfrm>
+            <a:off x="8614833" y="3548380"/>
+            <a:ext cx="768000" cy="13547"/>
+          </a:xfrm>
+          <a:prstGeom prst="straightConnector1">
+            <a:avLst/>
+          </a:prstGeom>
+          <a:ln w="41275" cmpd="sng">
+            <a:tailEnd type="arrow"/>
+          </a:ln>
+        </p:spPr>
+        <p:style>
+          <a:lnRef idx="1">
+            <a:schemeClr val="accent1"/>
+          </a:lnRef>
+          <a:fillRef idx="0">
+            <a:schemeClr val="accent1"/>
+          </a:fillRef>
+          <a:effectRef idx="0">
+            <a:schemeClr val="accent1"/>
+          </a:effectRef>
+          <a:fontRef idx="minor">
+            <a:schemeClr val="tx1"/>
+          </a:fontRef>
+        </p:style>
+      </p:cxnSp>
+      <p:sp>
+        <p:nvSpPr>
+          <p:cNvPr id="12" name="Rounded Rectangle 11"/>
+          <p:cNvSpPr/>
+          <p:nvPr/>
+        </p:nvSpPr>
+        <p:spPr>
+          <a:xfrm>
+            <a:off x="9365827" y="3233420"/>
+            <a:ext cx="2186940" cy="629073"/>
+          </a:xfrm>
+          <a:prstGeom prst="roundRect">
+            <a:avLst/>
+          </a:prstGeom>
+        </p:spPr>
+        <p:style>
+          <a:lnRef idx="2">
+            <a:schemeClr val="accent1"/>
+          </a:lnRef>
+          <a:fillRef idx="1">
+            <a:schemeClr val="lt1"/>
+          </a:fillRef>
+          <a:effectRef idx="0">
+            <a:schemeClr val="accent1"/>
+          </a:effectRef>
+          <a:fontRef idx="minor">
+            <a:schemeClr val="dk1"/>
+          </a:fontRef>
+        </p:style>
+        <p:txBody>
+          <a:bodyPr rtlCol="0" anchor="ctr"/>
+          <a:lstStyle/>
+          <a:p>
+            <a:pPr algn="ctr"/>
+            <a:r>
+              <a:rPr lang="en-US" sz="2400">
                 <a:latin typeface="Georgia" panose="02040502050405020303" charset="0"/>
                 <a:cs typeface="Georgia" panose="02040502050405020303" charset="0"/>
               </a:rPr>
-              <a:t>GloVe</a:t>
-            </a:r>
-            <a:endParaRPr lang="en-IN" altLang="en-US" sz="2400">
+              <a:t>Performance Evaluation</a:t>
+            </a:r>
+            <a:endParaRPr lang="en-US" sz="2400">
               <a:latin typeface="Georgia" panose="02040502050405020303" charset="0"/>
               <a:cs typeface="Georgia" panose="02040502050405020303" charset="0"/>
             </a:endParaRPr>
           </a:p>
-          <a:p>
-            <a:r>
-              <a:rPr lang="en-IN" altLang="en-US" sz="2400">
+        </p:txBody>
+      </p:sp>
+      <p:cxnSp>
+        <p:nvCxnSpPr>
+          <p:cNvPr id="13" name="Straight Arrow Connector 12"/>
+          <p:cNvCxnSpPr/>
+          <p:nvPr/>
+        </p:nvCxnSpPr>
+        <p:spPr>
+          <a:xfrm>
+            <a:off x="6024033" y="3561927"/>
+            <a:ext cx="376767" cy="9313"/>
+          </a:xfrm>
+          <a:prstGeom prst="straightConnector1">
+            <a:avLst/>
+          </a:prstGeom>
+          <a:ln w="41275" cmpd="sng">
+            <a:tailEnd type="arrow"/>
+          </a:ln>
+        </p:spPr>
+        <p:style>
+          <a:lnRef idx="1">
+            <a:schemeClr val="accent1"/>
+          </a:lnRef>
+          <a:fillRef idx="0">
+            <a:schemeClr val="accent1"/>
+          </a:fillRef>
+          <a:effectRef idx="0">
+            <a:schemeClr val="accent1"/>
+          </a:effectRef>
+          <a:fontRef idx="minor">
+            <a:schemeClr val="tx1"/>
+          </a:fontRef>
+        </p:style>
+      </p:cxnSp>
+      <p:sp>
+        <p:nvSpPr>
+          <p:cNvPr id="14" name="Text Box 13"/>
+          <p:cNvSpPr txBox="1"/>
+          <p:nvPr/>
+        </p:nvSpPr>
+        <p:spPr>
+          <a:xfrm>
+            <a:off x="7039187" y="4899660"/>
+            <a:ext cx="3248660" cy="829945"/>
+          </a:xfrm>
+          <a:prstGeom prst="rect">
+            <a:avLst/>
+          </a:prstGeom>
+          <a:noFill/>
+        </p:spPr>
+        <p:txBody>
+          <a:bodyPr wrap="square" rtlCol="0">
+            <a:spAutoFit/>
+          </a:bodyPr>
+          <a:lstStyle/>
+          <a:p>
+            <a:r>
+              <a:rPr lang="en-US" sz="2400">
                 <a:latin typeface="Georgia" panose="02040502050405020303" charset="0"/>
                 <a:cs typeface="Georgia" panose="02040502050405020303" charset="0"/>
               </a:rPr>
-              <a:t>Fast text</a:t>
-            </a:r>
-            <a:endParaRPr lang="en-IN" altLang="en-US" sz="2400">
+              <a:t>Hateful/Non-</a:t>
+            </a:r>
+            <a:r>
+              <a:rPr lang="en-US" sz="2400">
+                <a:latin typeface="Georgia" panose="02040502050405020303" charset="0"/>
+                <a:cs typeface="Georgia" panose="02040502050405020303" charset="0"/>
+                <a:sym typeface="+mn-ea"/>
+              </a:rPr>
+              <a:t>Hateful</a:t>
+            </a:r>
+            <a:endParaRPr lang="en-US" sz="2400">
               <a:latin typeface="Georgia" panose="02040502050405020303" charset="0"/>
               <a:cs typeface="Georgia" panose="02040502050405020303" charset="0"/>
             </a:endParaRPr>
           </a:p>
           <a:p>
-            <a:r>
-              <a:rPr lang="en-IN" altLang="en-US" sz="2400">
+            <a:endParaRPr lang="en-US" sz="2400">
+              <a:latin typeface="Georgia" panose="02040502050405020303" charset="0"/>
+              <a:cs typeface="Georgia" panose="02040502050405020303" charset="0"/>
+            </a:endParaRPr>
+          </a:p>
+        </p:txBody>
+      </p:sp>
+      <p:cxnSp>
+        <p:nvCxnSpPr>
+          <p:cNvPr id="15" name="Straight Arrow Connector 14"/>
+          <p:cNvCxnSpPr/>
+          <p:nvPr/>
+        </p:nvCxnSpPr>
+        <p:spPr>
+          <a:xfrm flipV="1">
+            <a:off x="2406227" y="2784687"/>
+            <a:ext cx="503767" cy="19473"/>
+          </a:xfrm>
+          <a:prstGeom prst="straightConnector1">
+            <a:avLst/>
+          </a:prstGeom>
+          <a:ln w="41275" cmpd="sng">
+            <a:tailEnd type="arrow"/>
+          </a:ln>
+        </p:spPr>
+        <p:style>
+          <a:lnRef idx="1">
+            <a:schemeClr val="accent1"/>
+          </a:lnRef>
+          <a:fillRef idx="0">
+            <a:schemeClr val="accent1"/>
+          </a:fillRef>
+          <a:effectRef idx="0">
+            <a:schemeClr val="accent1"/>
+          </a:effectRef>
+          <a:fontRef idx="minor">
+            <a:schemeClr val="tx1"/>
+          </a:fontRef>
+        </p:style>
+      </p:cxnSp>
+      <p:sp>
+        <p:nvSpPr>
+          <p:cNvPr id="16" name="Text Box 15"/>
+          <p:cNvSpPr txBox="1"/>
+          <p:nvPr/>
+        </p:nvSpPr>
+        <p:spPr>
+          <a:xfrm>
+            <a:off x="237913" y="2511213"/>
+            <a:ext cx="2468245" cy="502920"/>
+          </a:xfrm>
+          <a:prstGeom prst="rect">
+            <a:avLst/>
+          </a:prstGeom>
+          <a:noFill/>
+        </p:spPr>
+        <p:txBody>
+          <a:bodyPr wrap="none" rtlCol="0">
+            <a:spAutoFit/>
+          </a:bodyPr>
+          <a:p>
+            <a:r>
+              <a:rPr lang="en-US" sz="1335">
                 <a:latin typeface="Georgia" panose="02040502050405020303" charset="0"/>
                 <a:cs typeface="Georgia" panose="02040502050405020303" charset="0"/>
               </a:rPr>
-              <a:t>Bert</a:t>
-            </a:r>
-            <a:endParaRPr lang="en-IN" altLang="en-US" sz="2400">
+              <a:t>She hates Jews but  she didn't </a:t>
+            </a:r>
+            <a:endParaRPr lang="en-US" sz="1335">
               <a:latin typeface="Georgia" panose="02040502050405020303" charset="0"/>
               <a:cs typeface="Georgia" panose="02040502050405020303" charset="0"/>
             </a:endParaRPr>
           </a:p>
           <a:p>
             <a:r>
-              <a:rPr lang="en-IN" altLang="en-US" sz="2400" b="1">
+              <a:rPr lang="en-US" sz="1335">
                 <a:latin typeface="Georgia" panose="02040502050405020303" charset="0"/>
                 <a:cs typeface="Georgia" panose="02040502050405020303" charset="0"/>
               </a:rPr>
-              <a:t>Sbert</a:t>
-            </a:r>
-            <a:endParaRPr lang="en-IN" altLang="en-US" sz="2400" b="1">
+              <a:t>mean to say she hates Jews</a:t>
+            </a:r>
+            <a:endParaRPr lang="en-US" sz="1335">
               <a:latin typeface="Georgia" panose="02040502050405020303" charset="0"/>
               <a:cs typeface="Georgia" panose="02040502050405020303" charset="0"/>
             </a:endParaRPr>
           </a:p>
-          <a:p>
-            <a:endParaRPr lang="en-IN" altLang="en-US" sz="2400" b="1">
-              <a:latin typeface="Georgia" panose="02040502050405020303" charset="0"/>
-              <a:cs typeface="Georgia" panose="02040502050405020303" charset="0"/>
-            </a:endParaRPr>
-          </a:p>
-          <a:p>
-            <a:pPr marL="0" indent="0">
-              <a:buNone/>
-            </a:pPr>
-            <a:r>
-              <a:rPr lang="en-IN" altLang="en-US" b="1">
-                <a:latin typeface="Georgia" panose="02040502050405020303" charset="0"/>
-                <a:cs typeface="Georgia" panose="02040502050405020303" charset="0"/>
+        </p:txBody>
+      </p:sp>
+      <p:cxnSp>
+        <p:nvCxnSpPr>
+          <p:cNvPr id="17" name="Straight Arrow Connector 16"/>
+          <p:cNvCxnSpPr/>
+          <p:nvPr/>
+        </p:nvCxnSpPr>
+        <p:spPr>
+          <a:xfrm flipV="1">
+            <a:off x="2413000" y="4222327"/>
+            <a:ext cx="503767" cy="19473"/>
+          </a:xfrm>
+          <a:prstGeom prst="straightConnector1">
+            <a:avLst/>
+          </a:prstGeom>
+          <a:ln w="41275" cmpd="sng">
+            <a:tailEnd type="arrow"/>
+          </a:ln>
+        </p:spPr>
+        <p:style>
+          <a:lnRef idx="1">
+            <a:schemeClr val="accent1"/>
+          </a:lnRef>
+          <a:fillRef idx="0">
+            <a:schemeClr val="accent1"/>
+          </a:fillRef>
+          <a:effectRef idx="0">
+            <a:schemeClr val="accent1"/>
+          </a:effectRef>
+          <a:fontRef idx="minor">
+            <a:schemeClr val="tx1"/>
+          </a:fontRef>
+        </p:style>
+      </p:cxnSp>
+      <p:sp>
+        <p:nvSpPr>
+          <p:cNvPr id="6" name="Slide Number Placeholder 5"/>
+          <p:cNvSpPr>
+            <a:spLocks noGrp="1"/>
+          </p:cNvSpPr>
+          <p:nvPr>
+            <p:ph type="sldNum" sz="quarter" idx="12"/>
+          </p:nvPr>
+        </p:nvSpPr>
+        <p:spPr/>
+        <p:txBody>
+          <a:bodyPr/>
+          <a:p>
+            <a:pPr lvl="0" fontAlgn="base"/>
+            <a:fld id="{9A0DB2DC-4C9A-4742-B13C-FB6460FD3503}" type="slidenum">
+              <a:rPr lang="zh-CN" altLang="en-US" sz="1600" strike="noStrike" noProof="1" dirty="0">
+                <a:latin typeface="Arial" panose="020B0604020202020204" pitchFamily="34" charset="0"/>
+                <a:ea typeface="SimSun" panose="02010600030101010101" pitchFamily="2" charset="-122"/>
+                <a:cs typeface="+mn-cs"/>
               </a:rPr>
-              <a:t>Y sbert ?</a:t>
-            </a:r>
-            <a:endParaRPr lang="en-IN" altLang="en-US" b="1">
-              <a:latin typeface="Georgia" panose="02040502050405020303" charset="0"/>
-              <a:cs typeface="Georgia" panose="02040502050405020303" charset="0"/>
-            </a:endParaRPr>
-          </a:p>
-          <a:p>
-            <a:pPr>
-              <a:buFont typeface="Wingdings" panose="05000000000000000000" charset="0"/>
-              <a:buChar char="ü"/>
-            </a:pPr>
-            <a:r>
-              <a:rPr lang="en-IN" altLang="en-US">
-                <a:latin typeface="Georgia" panose="02040502050405020303" charset="0"/>
-                <a:cs typeface="Georgia" panose="02040502050405020303" charset="0"/>
-              </a:rPr>
-              <a:t> this gives sentences embeddings.</a:t>
-            </a:r>
-            <a:endParaRPr lang="en-IN" altLang="en-US">
-              <a:latin typeface="Georgia" panose="02040502050405020303" charset="0"/>
-              <a:cs typeface="Georgia" panose="02040502050405020303" charset="0"/>
-            </a:endParaRPr>
-          </a:p>
-          <a:p>
-            <a:pPr>
-              <a:buFont typeface="Wingdings" panose="05000000000000000000" charset="0"/>
-              <a:buChar char="ü"/>
-            </a:pPr>
-            <a:r>
-              <a:rPr lang="en-IN" altLang="en-US">
-                <a:latin typeface="Georgia" panose="02040502050405020303" charset="0"/>
-                <a:cs typeface="Georgia" panose="02040502050405020303" charset="0"/>
-              </a:rPr>
-              <a:t>contextual meaning is considered.</a:t>
-            </a:r>
-            <a:endParaRPr lang="en-IN" altLang="en-US">
-              <a:latin typeface="Georgia" panose="02040502050405020303" charset="0"/>
-              <a:cs typeface="Georgia" panose="02040502050405020303" charset="0"/>
-            </a:endParaRPr>
-          </a:p>
-          <a:p>
-            <a:pPr marL="0" indent="0">
-              <a:buFont typeface="Wingdings" panose="05000000000000000000" charset="0"/>
-              <a:buNone/>
-            </a:pPr>
-            <a:endParaRPr lang="en-IN" altLang="en-US">
-              <a:latin typeface="Georgia" panose="02040502050405020303" charset="0"/>
-              <a:cs typeface="Georgia" panose="02040502050405020303" charset="0"/>
-            </a:endParaRPr>
-          </a:p>
-          <a:p>
-            <a:endParaRPr lang="en-IN" altLang="en-US">
-              <a:latin typeface="Georgia" panose="02040502050405020303" charset="0"/>
-              <a:cs typeface="Georgia" panose="02040502050405020303" charset="0"/>
-            </a:endParaRPr>
-          </a:p>
-        </p:txBody>
-      </p:sp>
+            </a:fld>
+            <a:endParaRPr lang="zh-CN" altLang="en-US" sz="1600" strike="noStrike" noProof="1"/>
+          </a:p>
+        </p:txBody>
+      </p:sp>
+      <p:pic>
+        <p:nvPicPr>
+          <p:cNvPr id="19" name="Content Placeholder 18"/>
+          <p:cNvPicPr>
+            <a:picLocks noChangeAspect="1"/>
+          </p:cNvPicPr>
+          <p:nvPr>
+            <p:ph idx="1"/>
+          </p:nvPr>
+        </p:nvPicPr>
+        <p:blipFill>
+          <a:blip r:embed="rId1"/>
+          <a:stretch>
+            <a:fillRect/>
+          </a:stretch>
+        </p:blipFill>
+        <p:spPr>
+          <a:xfrm>
+            <a:off x="209973" y="3915833"/>
+            <a:ext cx="2203027" cy="1542627"/>
+          </a:xfrm>
+          <a:prstGeom prst="rect">
+            <a:avLst/>
+          </a:prstGeom>
+        </p:spPr>
+      </p:pic>
     </p:spTree>
   </p:cSld>
   <p:clrMapOvr>
@@ -3653,14 +4325,7 @@
         <p:cNvGrpSpPr/>
         <p:nvPr/>
       </p:nvGrpSpPr>
-      <p:grpSpPr>
-        <a:xfrm>
-          <a:off x="0" y="0"/>
-          <a:ext cx="0" cy="0"/>
-          <a:chOff x="0" y="0"/>
-          <a:chExt cx="0" cy="0"/>
-        </a:xfrm>
-      </p:grpSpPr>
+      <p:grpSpPr/>
       <p:sp>
         <p:nvSpPr>
           <p:cNvPr id="2" name="Title 1"/>
@@ -3668,165 +4333,175 @@
             <a:spLocks noGrp="1"/>
           </p:cNvSpPr>
           <p:nvPr>
-            <p:ph type="ctrTitle"/>
-          </p:nvPr>
-        </p:nvSpPr>
-        <p:spPr>
-          <a:xfrm>
-            <a:off x="1151255" y="577215"/>
-            <a:ext cx="5488940" cy="1164590"/>
-          </a:xfrm>
-        </p:spPr>
-        <p:txBody>
-          <a:bodyPr/>
-          <a:lstStyle/>
-          <a:p>
-            <a:r>
-              <a:rPr lang="en-IN" altLang="en-US" dirty="0"/>
-              <a:t>Xception Model</a:t>
-            </a:r>
-            <a:endParaRPr lang="en-IN" altLang="en-US" dirty="0"/>
-          </a:p>
-        </p:txBody>
-      </p:sp>
-      <p:sp>
-        <p:nvSpPr>
-          <p:cNvPr id="3" name="Subtitle 2"/>
-          <p:cNvSpPr>
-            <a:spLocks noGrp="1"/>
-          </p:cNvSpPr>
-          <p:nvPr>
-            <p:ph type="subTitle" idx="1"/>
-          </p:nvPr>
-        </p:nvSpPr>
-        <p:spPr>
-          <a:xfrm>
-            <a:off x="1151255" y="2082165"/>
-            <a:ext cx="10268585" cy="4775835"/>
-          </a:xfrm>
-        </p:spPr>
-        <p:txBody>
-          <a:bodyPr>
-            <a:normAutofit lnSpcReduction="20000"/>
-          </a:bodyPr>
-          <a:lstStyle/>
-          <a:p>
-            <a:pPr algn="l"/>
-            <a:r>
-              <a:rPr lang="en-IN" altLang="en-US" sz="2800"/>
-              <a:t>Why Xception ? </a:t>
-            </a:r>
-            <a:endParaRPr lang="en-IN" altLang="en-US" sz="2800"/>
-          </a:p>
-          <a:p>
-            <a:pPr algn="l"/>
-            <a:endParaRPr lang="en-IN" altLang="en-US" sz="2800"/>
-          </a:p>
-          <a:p>
-            <a:pPr marL="342900" indent="-342900" algn="l">
-              <a:lnSpc>
-                <a:spcPct val="110000"/>
-              </a:lnSpc>
+            <p:ph type="title"/>
+          </p:nvPr>
+        </p:nvSpPr>
+        <p:spPr/>
+        <p:txBody>
+          <a:bodyPr/>
+          <a:p>
+            <a:r>
+              <a:rPr lang="en-IN" altLang="en-US" sz="3600" b="1">
+                <a:latin typeface="Georgia" panose="02040502050405020303" charset="0"/>
+                <a:cs typeface="Georgia" panose="02040502050405020303" charset="0"/>
+              </a:rPr>
+              <a:t>Modals for Text Embeddings </a:t>
+            </a:r>
+            <a:endParaRPr lang="en-IN" altLang="en-US" sz="3600" b="1">
+              <a:latin typeface="Georgia" panose="02040502050405020303" charset="0"/>
+              <a:cs typeface="Georgia" panose="02040502050405020303" charset="0"/>
+            </a:endParaRPr>
+          </a:p>
+        </p:txBody>
+      </p:sp>
+      <p:sp>
+        <p:nvSpPr>
+          <p:cNvPr id="3" name="Content Placeholder 2"/>
+          <p:cNvSpPr>
+            <a:spLocks noGrp="1"/>
+          </p:cNvSpPr>
+          <p:nvPr>
+            <p:ph idx="1"/>
+          </p:nvPr>
+        </p:nvSpPr>
+        <p:spPr/>
+        <p:txBody>
+          <a:bodyPr/>
+          <a:p>
+            <a:r>
+              <a:rPr lang="en-IN" altLang="en-US" sz="2400">
+                <a:latin typeface="Georgia" panose="02040502050405020303" charset="0"/>
+                <a:cs typeface="Georgia" panose="02040502050405020303" charset="0"/>
+              </a:rPr>
+              <a:t>Word 2 vec</a:t>
+            </a:r>
+            <a:endParaRPr lang="en-IN" altLang="en-US" sz="2400">
+              <a:latin typeface="Georgia" panose="02040502050405020303" charset="0"/>
+              <a:cs typeface="Georgia" panose="02040502050405020303" charset="0"/>
+            </a:endParaRPr>
+          </a:p>
+          <a:p>
+            <a:r>
+              <a:rPr lang="en-IN" altLang="en-US" sz="2400">
+                <a:latin typeface="Georgia" panose="02040502050405020303" charset="0"/>
+                <a:cs typeface="Georgia" panose="02040502050405020303" charset="0"/>
+              </a:rPr>
+              <a:t>GloVe</a:t>
+            </a:r>
+            <a:endParaRPr lang="en-IN" altLang="en-US" sz="2400">
+              <a:latin typeface="Georgia" panose="02040502050405020303" charset="0"/>
+              <a:cs typeface="Georgia" panose="02040502050405020303" charset="0"/>
+            </a:endParaRPr>
+          </a:p>
+          <a:p>
+            <a:r>
+              <a:rPr lang="en-IN" altLang="en-US" sz="2400">
+                <a:latin typeface="Georgia" panose="02040502050405020303" charset="0"/>
+                <a:cs typeface="Georgia" panose="02040502050405020303" charset="0"/>
+              </a:rPr>
+              <a:t>Fast text</a:t>
+            </a:r>
+            <a:endParaRPr lang="en-IN" altLang="en-US" sz="2400">
+              <a:latin typeface="Georgia" panose="02040502050405020303" charset="0"/>
+              <a:cs typeface="Georgia" panose="02040502050405020303" charset="0"/>
+            </a:endParaRPr>
+          </a:p>
+          <a:p>
+            <a:r>
+              <a:rPr lang="en-IN" altLang="en-US" sz="2400">
+                <a:latin typeface="Georgia" panose="02040502050405020303" charset="0"/>
+                <a:cs typeface="Georgia" panose="02040502050405020303" charset="0"/>
+              </a:rPr>
+              <a:t>Bert</a:t>
+            </a:r>
+            <a:endParaRPr lang="en-IN" altLang="en-US" sz="2400">
+              <a:latin typeface="Georgia" panose="02040502050405020303" charset="0"/>
+              <a:cs typeface="Georgia" panose="02040502050405020303" charset="0"/>
+            </a:endParaRPr>
+          </a:p>
+          <a:p>
+            <a:r>
+              <a:rPr lang="en-IN" altLang="en-US" sz="2400" b="1">
+                <a:latin typeface="Georgia" panose="02040502050405020303" charset="0"/>
+                <a:cs typeface="Georgia" panose="02040502050405020303" charset="0"/>
+              </a:rPr>
+              <a:t>Sbert</a:t>
+            </a:r>
+            <a:endParaRPr lang="en-IN" altLang="en-US" sz="2400" b="1">
+              <a:latin typeface="Georgia" panose="02040502050405020303" charset="0"/>
+              <a:cs typeface="Georgia" panose="02040502050405020303" charset="0"/>
+            </a:endParaRPr>
+          </a:p>
+          <a:p>
+            <a:endParaRPr lang="en-IN" altLang="en-US" sz="2400" b="1">
+              <a:latin typeface="Georgia" panose="02040502050405020303" charset="0"/>
+              <a:cs typeface="Georgia" panose="02040502050405020303" charset="0"/>
+            </a:endParaRPr>
+          </a:p>
+          <a:p>
+            <a:pPr marL="0" indent="0">
+              <a:buNone/>
+            </a:pPr>
+            <a:r>
+              <a:rPr lang="en-IN" altLang="en-US" b="1">
+                <a:latin typeface="Georgia" panose="02040502050405020303" charset="0"/>
+                <a:cs typeface="Georgia" panose="02040502050405020303" charset="0"/>
+              </a:rPr>
+              <a:t>Why Sbert ?</a:t>
+            </a:r>
+            <a:endParaRPr lang="en-IN" altLang="en-US" b="1">
+              <a:latin typeface="Georgia" panose="02040502050405020303" charset="0"/>
+              <a:cs typeface="Georgia" panose="02040502050405020303" charset="0"/>
+            </a:endParaRPr>
+          </a:p>
+          <a:p>
+            <a:pPr>
               <a:buFont typeface="Wingdings" panose="05000000000000000000" charset="0"/>
               <a:buChar char="ü"/>
             </a:pPr>
             <a:r>
-              <a:rPr lang="en-IN" altLang="en-US" sz="2800">
-                <a:latin typeface="Times New Roman" panose="02020603050405020304" charset="0"/>
-                <a:cs typeface="Times New Roman" panose="02020603050405020304" charset="0"/>
+              <a:rPr lang="en-IN" altLang="en-US">
+                <a:latin typeface="Georgia" panose="02040502050405020303" charset="0"/>
+                <a:cs typeface="Georgia" panose="02040502050405020303" charset="0"/>
               </a:rPr>
-              <a:t> It implements </a:t>
-            </a:r>
-            <a:r>
-              <a:rPr lang="en-IN" altLang="en-US" sz="2800" b="1" i="1">
-                <a:latin typeface="Times New Roman" panose="02020603050405020304" charset="0"/>
-                <a:cs typeface="Times New Roman" panose="02020603050405020304" charset="0"/>
-              </a:rPr>
-              <a:t>depthwise Separable Convolutions</a:t>
-            </a:r>
-            <a:r>
-              <a:rPr lang="en-IN" altLang="en-US" sz="2800">
-                <a:latin typeface="Times New Roman" panose="02020603050405020304" charset="0"/>
-                <a:cs typeface="Times New Roman" panose="02020603050405020304" charset="0"/>
-              </a:rPr>
-              <a:t>,which helps in reducing computation time(9 times), parameters</a:t>
-            </a:r>
-            <a:endParaRPr lang="en-IN" altLang="en-US" sz="2800">
-              <a:latin typeface="Times New Roman" panose="02020603050405020304" charset="0"/>
-              <a:cs typeface="Times New Roman" panose="02020603050405020304" charset="0"/>
+              <a:t> this gives sentences embeddings.</a:t>
+            </a:r>
+            <a:endParaRPr lang="en-IN" altLang="en-US">
+              <a:latin typeface="Georgia" panose="02040502050405020303" charset="0"/>
+              <a:cs typeface="Georgia" panose="02040502050405020303" charset="0"/>
             </a:endParaRPr>
           </a:p>
           <a:p>
-            <a:pPr marL="342900" indent="-342900" algn="l">
-              <a:lnSpc>
-                <a:spcPct val="110000"/>
-              </a:lnSpc>
+            <a:pPr>
               <a:buFont typeface="Wingdings" panose="05000000000000000000" charset="0"/>
               <a:buChar char="ü"/>
             </a:pPr>
             <a:r>
-              <a:rPr lang="en-IN" altLang="en-US" sz="2800">
-                <a:latin typeface="Times New Roman" panose="02020603050405020304" charset="0"/>
-                <a:cs typeface="Times New Roman" panose="02020603050405020304" charset="0"/>
+              <a:rPr lang="en-IN" altLang="en-US">
+                <a:latin typeface="Georgia" panose="02040502050405020303" charset="0"/>
+                <a:cs typeface="Georgia" panose="02040502050405020303" charset="0"/>
               </a:rPr>
-              <a:t> Can be used in Multimodal Nets.</a:t>
-            </a:r>
-            <a:endParaRPr lang="en-IN" altLang="en-US" sz="2800">
-              <a:latin typeface="Times New Roman" panose="02020603050405020304" charset="0"/>
-              <a:cs typeface="Times New Roman" panose="02020603050405020304" charset="0"/>
+              <a:t>contextual meaning is considered.</a:t>
+            </a:r>
+            <a:endParaRPr lang="en-IN" altLang="en-US">
+              <a:latin typeface="Georgia" panose="02040502050405020303" charset="0"/>
+              <a:cs typeface="Georgia" panose="02040502050405020303" charset="0"/>
             </a:endParaRPr>
           </a:p>
           <a:p>
-            <a:pPr marL="342900" indent="-342900" algn="l">
-              <a:lnSpc>
-                <a:spcPct val="110000"/>
-              </a:lnSpc>
+            <a:pPr marL="0" indent="0">
               <a:buFont typeface="Wingdings" panose="05000000000000000000" charset="0"/>
-              <a:buChar char="ü"/>
+              <a:buNone/>
             </a:pPr>
-            <a:r>
-              <a:rPr lang="en-IN" altLang="en-US" sz="2800">
-                <a:latin typeface="Times New Roman" panose="02020603050405020304" charset="0"/>
-                <a:cs typeface="Times New Roman" panose="02020603050405020304" charset="0"/>
-              </a:rPr>
-              <a:t> Large gains in convergence speed, as well as a significant reduction in model size</a:t>
-            </a:r>
-            <a:endParaRPr lang="en-IN" altLang="en-US" sz="2800">
-              <a:latin typeface="Times New Roman" panose="02020603050405020304" charset="0"/>
-              <a:cs typeface="Times New Roman" panose="02020603050405020304" charset="0"/>
+            <a:endParaRPr lang="en-IN" altLang="en-US">
+              <a:latin typeface="Georgia" panose="02040502050405020303" charset="0"/>
+              <a:cs typeface="Georgia" panose="02040502050405020303" charset="0"/>
             </a:endParaRPr>
           </a:p>
           <a:p>
-            <a:pPr marL="342900" indent="-342900" algn="l">
-              <a:lnSpc>
-                <a:spcPct val="110000"/>
-              </a:lnSpc>
-              <a:buFont typeface="Wingdings" panose="05000000000000000000" charset="0"/>
-              <a:buChar char="ü"/>
-            </a:pPr>
-            <a:r>
-              <a:rPr lang="en-IN" altLang="en-US" sz="2800">
-                <a:latin typeface="Times New Roman" panose="02020603050405020304" charset="0"/>
-                <a:cs typeface="Times New Roman" panose="02020603050405020304" charset="0"/>
-              </a:rPr>
-              <a:t> Can be used for multi-label classification tasks.</a:t>
-            </a:r>
-            <a:endParaRPr lang="en-IN" altLang="en-US" sz="2800">
-              <a:latin typeface="Times New Roman" panose="02020603050405020304" charset="0"/>
-              <a:cs typeface="Times New Roman" panose="02020603050405020304" charset="0"/>
-            </a:endParaRPr>
-          </a:p>
-          <a:p>
-            <a:pPr marL="342900" indent="-342900" algn="l">
-              <a:lnSpc>
-                <a:spcPct val="110000"/>
-              </a:lnSpc>
-              <a:buFont typeface="Wingdings" panose="05000000000000000000" charset="0"/>
-              <a:buChar char="ü"/>
-            </a:pPr>
-            <a:endParaRPr lang="en-IN" altLang="en-US" sz="2800">
-              <a:latin typeface="Times New Roman" panose="02020603050405020304" charset="0"/>
-              <a:cs typeface="Times New Roman" panose="02020603050405020304" charset="0"/>
+            <a:endParaRPr lang="en-IN" altLang="en-US">
+              <a:latin typeface="Georgia" panose="02040502050405020303" charset="0"/>
+              <a:cs typeface="Georgia" panose="02040502050405020303" charset="0"/>
             </a:endParaRPr>
           </a:p>
         </p:txBody>
@@ -3848,6 +4523,201 @@
         <p:cNvGrpSpPr/>
         <p:nvPr/>
       </p:nvGrpSpPr>
+      <p:grpSpPr>
+        <a:xfrm>
+          <a:off x="0" y="0"/>
+          <a:ext cx="0" cy="0"/>
+          <a:chOff x="0" y="0"/>
+          <a:chExt cx="0" cy="0"/>
+        </a:xfrm>
+      </p:grpSpPr>
+      <p:sp>
+        <p:nvSpPr>
+          <p:cNvPr id="2" name="Title 1"/>
+          <p:cNvSpPr>
+            <a:spLocks noGrp="1"/>
+          </p:cNvSpPr>
+          <p:nvPr>
+            <p:ph type="ctrTitle"/>
+          </p:nvPr>
+        </p:nvSpPr>
+        <p:spPr>
+          <a:xfrm>
+            <a:off x="1151255" y="577215"/>
+            <a:ext cx="5488940" cy="1164590"/>
+          </a:xfrm>
+        </p:spPr>
+        <p:txBody>
+          <a:bodyPr/>
+          <a:lstStyle/>
+          <a:p>
+            <a:r>
+              <a:rPr lang="en-IN" altLang="en-US" dirty="0"/>
+              <a:t>Xception Model</a:t>
+            </a:r>
+            <a:endParaRPr lang="en-IN" altLang="en-US" dirty="0"/>
+          </a:p>
+        </p:txBody>
+      </p:sp>
+      <p:sp>
+        <p:nvSpPr>
+          <p:cNvPr id="3" name="Subtitle 2"/>
+          <p:cNvSpPr>
+            <a:spLocks noGrp="1"/>
+          </p:cNvSpPr>
+          <p:nvPr>
+            <p:ph type="subTitle" idx="1"/>
+          </p:nvPr>
+        </p:nvSpPr>
+        <p:spPr>
+          <a:xfrm>
+            <a:off x="1151255" y="2082165"/>
+            <a:ext cx="10268585" cy="4775835"/>
+          </a:xfrm>
+        </p:spPr>
+        <p:txBody>
+          <a:bodyPr>
+            <a:normAutofit lnSpcReduction="20000"/>
+          </a:bodyPr>
+          <a:lstStyle/>
+          <a:p>
+            <a:pPr algn="l"/>
+            <a:r>
+              <a:rPr lang="en-IN" altLang="en-US" sz="2800"/>
+              <a:t>Why Xception ? </a:t>
+            </a:r>
+            <a:endParaRPr lang="en-IN" altLang="en-US" sz="2800"/>
+          </a:p>
+          <a:p>
+            <a:pPr algn="l"/>
+            <a:endParaRPr lang="en-IN" altLang="en-US" sz="2800"/>
+          </a:p>
+          <a:p>
+            <a:pPr marL="342900" indent="-342900" algn="l">
+              <a:lnSpc>
+                <a:spcPct val="110000"/>
+              </a:lnSpc>
+              <a:buFont typeface="Wingdings" panose="05000000000000000000" charset="0"/>
+              <a:buChar char="ü"/>
+            </a:pPr>
+            <a:r>
+              <a:rPr lang="en-IN" altLang="en-US" sz="2800">
+                <a:latin typeface="Times New Roman" panose="02020603050405020304" charset="0"/>
+                <a:cs typeface="Times New Roman" panose="02020603050405020304" charset="0"/>
+              </a:rPr>
+              <a:t> It implements </a:t>
+            </a:r>
+            <a:r>
+              <a:rPr lang="en-IN" altLang="en-US" sz="2800" b="1" i="1">
+                <a:latin typeface="Times New Roman" panose="02020603050405020304" charset="0"/>
+                <a:cs typeface="Times New Roman" panose="02020603050405020304" charset="0"/>
+              </a:rPr>
+              <a:t>depthwise Separable Convolutions</a:t>
+            </a:r>
+            <a:r>
+              <a:rPr lang="en-IN" altLang="en-US" sz="2800">
+                <a:latin typeface="Times New Roman" panose="02020603050405020304" charset="0"/>
+                <a:cs typeface="Times New Roman" panose="02020603050405020304" charset="0"/>
+              </a:rPr>
+              <a:t>,which helps in reducing computation time(9 times), parameters</a:t>
+            </a:r>
+            <a:endParaRPr lang="en-IN" altLang="en-US" sz="2800">
+              <a:latin typeface="Times New Roman" panose="02020603050405020304" charset="0"/>
+              <a:cs typeface="Times New Roman" panose="02020603050405020304" charset="0"/>
+            </a:endParaRPr>
+          </a:p>
+          <a:p>
+            <a:pPr marL="342900" indent="-342900" algn="l">
+              <a:lnSpc>
+                <a:spcPct val="110000"/>
+              </a:lnSpc>
+              <a:buFont typeface="Wingdings" panose="05000000000000000000" charset="0"/>
+              <a:buChar char="ü"/>
+            </a:pPr>
+            <a:r>
+              <a:rPr lang="en-IN" altLang="en-US" sz="2800">
+                <a:latin typeface="Times New Roman" panose="02020603050405020304" charset="0"/>
+                <a:cs typeface="Times New Roman" panose="02020603050405020304" charset="0"/>
+              </a:rPr>
+              <a:t> Can be used in Multimodal Nets.</a:t>
+            </a:r>
+            <a:endParaRPr lang="en-IN" altLang="en-US" sz="2800">
+              <a:latin typeface="Times New Roman" panose="02020603050405020304" charset="0"/>
+              <a:cs typeface="Times New Roman" panose="02020603050405020304" charset="0"/>
+            </a:endParaRPr>
+          </a:p>
+          <a:p>
+            <a:pPr marL="342900" indent="-342900" algn="l">
+              <a:lnSpc>
+                <a:spcPct val="110000"/>
+              </a:lnSpc>
+              <a:buFont typeface="Wingdings" panose="05000000000000000000" charset="0"/>
+              <a:buChar char="ü"/>
+            </a:pPr>
+            <a:r>
+              <a:rPr lang="en-IN" altLang="en-US" sz="2800">
+                <a:latin typeface="Times New Roman" panose="02020603050405020304" charset="0"/>
+                <a:cs typeface="Times New Roman" panose="02020603050405020304" charset="0"/>
+              </a:rPr>
+              <a:t> Large gains in convergence speed, as well as a significant reduction in model size</a:t>
+            </a:r>
+            <a:endParaRPr lang="en-IN" altLang="en-US" sz="2800">
+              <a:latin typeface="Times New Roman" panose="02020603050405020304" charset="0"/>
+              <a:cs typeface="Times New Roman" panose="02020603050405020304" charset="0"/>
+            </a:endParaRPr>
+          </a:p>
+          <a:p>
+            <a:pPr marL="342900" indent="-342900" algn="l">
+              <a:lnSpc>
+                <a:spcPct val="110000"/>
+              </a:lnSpc>
+              <a:buFont typeface="Wingdings" panose="05000000000000000000" charset="0"/>
+              <a:buChar char="ü"/>
+            </a:pPr>
+            <a:r>
+              <a:rPr lang="en-IN" altLang="en-US" sz="2800">
+                <a:latin typeface="Times New Roman" panose="02020603050405020304" charset="0"/>
+                <a:cs typeface="Times New Roman" panose="02020603050405020304" charset="0"/>
+              </a:rPr>
+              <a:t> Can be used for multi-label classification tasks.</a:t>
+            </a:r>
+            <a:endParaRPr lang="en-IN" altLang="en-US" sz="2800">
+              <a:latin typeface="Times New Roman" panose="02020603050405020304" charset="0"/>
+              <a:cs typeface="Times New Roman" panose="02020603050405020304" charset="0"/>
+            </a:endParaRPr>
+          </a:p>
+          <a:p>
+            <a:pPr marL="342900" indent="-342900" algn="l">
+              <a:lnSpc>
+                <a:spcPct val="110000"/>
+              </a:lnSpc>
+              <a:buFont typeface="Wingdings" panose="05000000000000000000" charset="0"/>
+              <a:buChar char="ü"/>
+            </a:pPr>
+            <a:endParaRPr lang="en-IN" altLang="en-US" sz="2800">
+              <a:latin typeface="Times New Roman" panose="02020603050405020304" charset="0"/>
+              <a:cs typeface="Times New Roman" panose="02020603050405020304" charset="0"/>
+            </a:endParaRPr>
+          </a:p>
+        </p:txBody>
+      </p:sp>
+    </p:spTree>
+  </p:cSld>
+  <p:clrMapOvr>
+    <a:masterClrMapping/>
+  </p:clrMapOvr>
+</p:sld>
+</file>
+
+<file path=ppt/slides/slide5.xml><?xml version="1.0" encoding="utf-8"?>
+<p:sld xmlns:a="http://schemas.openxmlformats.org/drawingml/2006/main" xmlns:r="http://schemas.openxmlformats.org/officeDocument/2006/relationships" xmlns:p="http://schemas.openxmlformats.org/presentationml/2006/main">
+  <p:cSld>
+    <p:spTree>
+      <p:nvGrpSpPr>
+        <p:cNvPr id="1" name=""/>
+        <p:cNvGrpSpPr/>
+        <p:nvPr/>
+      </p:nvGrpSpPr>
       <p:grpSpPr/>
       <p:sp>
         <p:nvSpPr>
@@ -3893,7 +4763,7 @@
         </p:blipFill>
         <p:spPr>
           <a:xfrm>
-            <a:off x="0" y="1076325"/>
+            <a:off x="916305" y="1256030"/>
             <a:ext cx="4778375" cy="5041900"/>
           </a:xfrm>
         </p:spPr>
@@ -3916,7 +4786,7 @@
         </p:blipFill>
         <p:spPr>
           <a:xfrm>
-            <a:off x="4841875" y="1223645"/>
+            <a:off x="6756400" y="1363980"/>
             <a:ext cx="4138613" cy="3282950"/>
           </a:xfrm>
         </p:spPr>
@@ -3937,7 +4807,7 @@
         </p:blipFill>
         <p:spPr>
           <a:xfrm>
-            <a:off x="5256213" y="4359275"/>
+            <a:off x="7110413" y="4646930"/>
             <a:ext cx="3430587" cy="2070100"/>
           </a:xfrm>
           <a:prstGeom prst="rect">
@@ -3957,7 +4827,7 @@
         </p:nvSpPr>
         <p:spPr>
           <a:xfrm>
-            <a:off x="575310" y="6191885"/>
+            <a:off x="661035" y="6297930"/>
             <a:ext cx="3021965" cy="275590"/>
           </a:xfrm>
           <a:prstGeom prst="rect">
@@ -4032,7 +4902,7 @@
 </p:sld>
 </file>
 
-<file path=ppt/slides/slide5.xml><?xml version="1.0" encoding="utf-8"?>
+<file path=ppt/slides/slide6.xml><?xml version="1.0" encoding="utf-8"?>
 <p:sld xmlns:a="http://schemas.openxmlformats.org/drawingml/2006/main" xmlns:r="http://schemas.openxmlformats.org/officeDocument/2006/relationships" xmlns:p="http://schemas.openxmlformats.org/presentationml/2006/main">
   <p:cSld>
     <p:spTree>
@@ -4144,7 +5014,7 @@
 </p:sld>
 </file>
 
-<file path=ppt/slides/slide6.xml><?xml version="1.0" encoding="utf-8"?>
+<file path=ppt/slides/slide7.xml><?xml version="1.0" encoding="utf-8"?>
 <p:sld xmlns:a="http://schemas.openxmlformats.org/drawingml/2006/main" xmlns:r="http://schemas.openxmlformats.org/officeDocument/2006/relationships" xmlns:p="http://schemas.openxmlformats.org/presentationml/2006/main">
   <p:cSld>
     <p:spTree>
@@ -4213,7 +5083,7 @@
 </p:sld>
 </file>
 
-<file path=ppt/slides/slide7.xml><?xml version="1.0" encoding="utf-8"?>
+<file path=ppt/slides/slide8.xml><?xml version="1.0" encoding="utf-8"?>
 <p:sld xmlns:a="http://schemas.openxmlformats.org/drawingml/2006/main" xmlns:r="http://schemas.openxmlformats.org/officeDocument/2006/relationships" xmlns:p="http://schemas.openxmlformats.org/presentationml/2006/main">
   <p:cSld>
     <p:spTree>
@@ -4286,7 +5156,7 @@
 </p:sld>
 </file>
 
-<file path=ppt/slides/slide8.xml><?xml version="1.0" encoding="utf-8"?>
+<file path=ppt/slides/slide9.xml><?xml version="1.0" encoding="utf-8"?>
 <p:sld xmlns:a="http://schemas.openxmlformats.org/drawingml/2006/main" xmlns:r="http://schemas.openxmlformats.org/officeDocument/2006/relationships" xmlns:p="http://schemas.openxmlformats.org/presentationml/2006/main">
   <p:cSld>
     <p:spTree>

</xml_diff>